<commit_message>
updating the last slides
</commit_message>
<xml_diff>
--- a/conf-calls/2019-09-25/community_call_2019-09-25 .pptx
+++ b/conf-calls/2019-09-25/community_call_2019-09-25 .pptx
@@ -201,7 +201,7 @@
           <a:p>
             <a:fld id="{4E90C406-5597-1243-A239-87CBB2C3F8E0}" type="datetimeFigureOut">
               <a:rPr lang="en-US" smtClean="0"/>
-              <a:t>9/21/19</a:t>
+              <a:t>9/22/19</a:t>
             </a:fld>
             <a:endParaRPr lang="en-US"/>
           </a:p>
@@ -699,7 +699,7 @@
           <a:p>
             <a:fld id="{7B2038F6-8AC7-C745-A412-1D5CBAF3D8B9}" type="datetimeFigureOut">
               <a:rPr lang="en-US" smtClean="0"/>
-              <a:t>9/21/19</a:t>
+              <a:t>9/22/19</a:t>
             </a:fld>
             <a:endParaRPr lang="en-US"/>
           </a:p>
@@ -897,7 +897,7 @@
           <a:p>
             <a:fld id="{7B2038F6-8AC7-C745-A412-1D5CBAF3D8B9}" type="datetimeFigureOut">
               <a:rPr lang="en-US" smtClean="0"/>
-              <a:t>9/21/19</a:t>
+              <a:t>9/22/19</a:t>
             </a:fld>
             <a:endParaRPr lang="en-US"/>
           </a:p>
@@ -1105,7 +1105,7 @@
           <a:p>
             <a:fld id="{7B2038F6-8AC7-C745-A412-1D5CBAF3D8B9}" type="datetimeFigureOut">
               <a:rPr lang="en-US" smtClean="0"/>
-              <a:t>9/21/19</a:t>
+              <a:t>9/22/19</a:t>
             </a:fld>
             <a:endParaRPr lang="en-US"/>
           </a:p>
@@ -4762,7 +4762,7 @@
           <a:p>
             <a:fld id="{7B2038F6-8AC7-C745-A412-1D5CBAF3D8B9}" type="datetimeFigureOut">
               <a:rPr lang="en-US" smtClean="0"/>
-              <a:t>9/21/19</a:t>
+              <a:t>9/22/19</a:t>
             </a:fld>
             <a:endParaRPr lang="en-US"/>
           </a:p>
@@ -5037,7 +5037,7 @@
           <a:p>
             <a:fld id="{7B2038F6-8AC7-C745-A412-1D5CBAF3D8B9}" type="datetimeFigureOut">
               <a:rPr lang="en-US" smtClean="0"/>
-              <a:t>9/21/19</a:t>
+              <a:t>9/22/19</a:t>
             </a:fld>
             <a:endParaRPr lang="en-US"/>
           </a:p>
@@ -5302,7 +5302,7 @@
           <a:p>
             <a:fld id="{7B2038F6-8AC7-C745-A412-1D5CBAF3D8B9}" type="datetimeFigureOut">
               <a:rPr lang="en-US" smtClean="0"/>
-              <a:t>9/21/19</a:t>
+              <a:t>9/22/19</a:t>
             </a:fld>
             <a:endParaRPr lang="en-US"/>
           </a:p>
@@ -5714,7 +5714,7 @@
           <a:p>
             <a:fld id="{7B2038F6-8AC7-C745-A412-1D5CBAF3D8B9}" type="datetimeFigureOut">
               <a:rPr lang="en-US" smtClean="0"/>
-              <a:t>9/21/19</a:t>
+              <a:t>9/22/19</a:t>
             </a:fld>
             <a:endParaRPr lang="en-US"/>
           </a:p>
@@ -5855,7 +5855,7 @@
           <a:p>
             <a:fld id="{7B2038F6-8AC7-C745-A412-1D5CBAF3D8B9}" type="datetimeFigureOut">
               <a:rPr lang="en-US" smtClean="0"/>
-              <a:t>9/21/19</a:t>
+              <a:t>9/22/19</a:t>
             </a:fld>
             <a:endParaRPr lang="en-US"/>
           </a:p>
@@ -5968,7 +5968,7 @@
           <a:p>
             <a:fld id="{7B2038F6-8AC7-C745-A412-1D5CBAF3D8B9}" type="datetimeFigureOut">
               <a:rPr lang="en-US" smtClean="0"/>
-              <a:t>9/21/19</a:t>
+              <a:t>9/22/19</a:t>
             </a:fld>
             <a:endParaRPr lang="en-US"/>
           </a:p>
@@ -6279,7 +6279,7 @@
           <a:p>
             <a:fld id="{7B2038F6-8AC7-C745-A412-1D5CBAF3D8B9}" type="datetimeFigureOut">
               <a:rPr lang="en-US" smtClean="0"/>
-              <a:t>9/21/19</a:t>
+              <a:t>9/22/19</a:t>
             </a:fld>
             <a:endParaRPr lang="en-US"/>
           </a:p>
@@ -6567,7 +6567,7 @@
           <a:p>
             <a:fld id="{7B2038F6-8AC7-C745-A412-1D5CBAF3D8B9}" type="datetimeFigureOut">
               <a:rPr lang="en-US" smtClean="0"/>
-              <a:t>9/21/19</a:t>
+              <a:t>9/22/19</a:t>
             </a:fld>
             <a:endParaRPr lang="en-US"/>
           </a:p>
@@ -6808,7 +6808,7 @@
           <a:p>
             <a:fld id="{7B2038F6-8AC7-C745-A412-1D5CBAF3D8B9}" type="datetimeFigureOut">
               <a:rPr lang="en-US" smtClean="0"/>
-              <a:t>9/21/19</a:t>
+              <a:t>9/22/19</a:t>
             </a:fld>
             <a:endParaRPr lang="en-US"/>
           </a:p>
@@ -9343,7 +9343,7 @@
                 <a:ea typeface="等线" panose="02010600030101010101" pitchFamily="2" charset="-122"/>
                 <a:cs typeface="Arial" panose="020B0604020202020204" pitchFamily="34" charset="0"/>
               </a:rPr>
-              <a:t>06:00-07:00</a:t>
+              <a:t>06:00-06:30</a:t>
             </a:r>
             <a:r>
               <a:rPr kumimoji="0" lang="zh-CN" altLang="en-US" sz="2400" b="1" i="0" u="none" strike="noStrike" kern="1200" cap="none" spc="0" normalizeH="0" baseline="0" noProof="0" dirty="0">
@@ -10576,6 +10576,11 @@
               <a:rPr lang="en-US" altLang="zh-CN" sz="2800" dirty="0"/>
               <a:t>Zou</a:t>
             </a:r>
+            <a:r>
+              <a:rPr lang="zh-CN" altLang="en-US" sz="2800" dirty="0"/>
+              <a:t> </a:t>
+            </a:r>
+            <a:endParaRPr lang="en-US" altLang="zh-CN" sz="2800" dirty="0"/>
           </a:p>
           <a:p>
             <a:pPr>
@@ -10639,14 +10644,10 @@
               <a:rPr lang="en-US" altLang="zh-CN" sz="3200" dirty="0" err="1"/>
               <a:t>Dolitsky</a:t>
             </a:r>
-            <a:endParaRPr lang="en-US" altLang="zh-CN" sz="3200" dirty="0"/>
-          </a:p>
-          <a:p>
-            <a:pPr lvl="1">
-              <a:lnSpc>
-                <a:spcPct val="114999"/>
-              </a:lnSpc>
-            </a:pPr>
+            <a:r>
+              <a:rPr lang="zh-CN" altLang="en-US" sz="3200" dirty="0"/>
+              <a:t> </a:t>
+            </a:r>
             <a:r>
               <a:rPr lang="en-US" altLang="zh-CN" sz="2800" dirty="0">
                 <a:hlinkClick r:id="rId4"/>
@@ -11165,287 +11166,287 @@
           <a:lstStyle/>
           <a:p>
             <a:r>
-              <a:rPr lang="en-US" altLang="zh-CN"/>
+              <a:rPr lang="en-US" altLang="zh-CN" dirty="0"/>
               <a:t>Meeting</a:t>
             </a:r>
             <a:r>
-              <a:rPr lang="zh-CN" altLang="en-US"/>
+              <a:rPr lang="zh-CN" altLang="en-US" dirty="0"/>
               <a:t> </a:t>
             </a:r>
             <a:r>
-              <a:rPr lang="en-US" altLang="zh-CN"/>
+              <a:rPr lang="en-US" altLang="zh-CN" dirty="0"/>
               <a:t>is</a:t>
             </a:r>
             <a:r>
-              <a:rPr lang="zh-CN" altLang="en-US"/>
+              <a:rPr lang="zh-CN" altLang="en-US" dirty="0"/>
               <a:t> </a:t>
             </a:r>
             <a:r>
-              <a:rPr lang="en-US" altLang="zh-CN"/>
+              <a:rPr lang="en-US" altLang="zh-CN" dirty="0"/>
               <a:t>recorded</a:t>
             </a:r>
             <a:r>
-              <a:rPr lang="zh-CN" altLang="en-US"/>
+              <a:rPr lang="zh-CN" altLang="en-US" dirty="0"/>
               <a:t> </a:t>
             </a:r>
             <a:r>
-              <a:rPr lang="en-US" altLang="zh-CN"/>
+              <a:rPr lang="en-US" altLang="zh-CN" dirty="0"/>
               <a:t>and</a:t>
             </a:r>
             <a:r>
-              <a:rPr lang="zh-CN" altLang="en-US"/>
+              <a:rPr lang="zh-CN" altLang="en-US" dirty="0"/>
               <a:t> </a:t>
             </a:r>
             <a:r>
-              <a:rPr lang="en-US" altLang="zh-CN"/>
+              <a:rPr lang="en-US" altLang="zh-CN" dirty="0"/>
               <a:t>the</a:t>
             </a:r>
             <a:r>
-              <a:rPr lang="zh-CN" altLang="en-US"/>
+              <a:rPr lang="zh-CN" altLang="en-US" dirty="0"/>
               <a:t> </a:t>
             </a:r>
             <a:r>
-              <a:rPr lang="en-US" altLang="zh-CN"/>
+              <a:rPr lang="en-US" altLang="zh-CN" dirty="0"/>
               <a:t>recording</a:t>
             </a:r>
             <a:r>
-              <a:rPr lang="zh-CN" altLang="en-US"/>
+              <a:rPr lang="zh-CN" altLang="en-US" dirty="0"/>
               <a:t> </a:t>
             </a:r>
             <a:r>
-              <a:rPr lang="en-US" altLang="zh-CN"/>
+              <a:rPr lang="en-US" altLang="zh-CN" dirty="0"/>
               <a:t>link</a:t>
             </a:r>
             <a:r>
-              <a:rPr lang="zh-CN" altLang="en-US"/>
+              <a:rPr lang="zh-CN" altLang="en-US" dirty="0"/>
               <a:t> </a:t>
             </a:r>
             <a:r>
-              <a:rPr lang="en-US" altLang="zh-CN"/>
+              <a:rPr lang="en-US" altLang="zh-CN" dirty="0"/>
               <a:t>will</a:t>
             </a:r>
             <a:r>
-              <a:rPr lang="zh-CN" altLang="en-US"/>
+              <a:rPr lang="zh-CN" altLang="en-US" dirty="0"/>
               <a:t> </a:t>
             </a:r>
             <a:r>
-              <a:rPr lang="en-US" altLang="zh-CN"/>
+              <a:rPr lang="en-US" altLang="zh-CN" dirty="0"/>
               <a:t>be</a:t>
             </a:r>
             <a:r>
-              <a:rPr lang="zh-CN" altLang="en-US"/>
+              <a:rPr lang="zh-CN" altLang="en-US" dirty="0"/>
               <a:t> </a:t>
             </a:r>
             <a:r>
-              <a:rPr lang="en-US" altLang="zh-CN"/>
+              <a:rPr lang="en-US" altLang="zh-CN" dirty="0"/>
               <a:t>updated</a:t>
             </a:r>
             <a:r>
-              <a:rPr lang="zh-CN" altLang="en-US"/>
+              <a:rPr lang="zh-CN" altLang="en-US" dirty="0"/>
               <a:t> </a:t>
             </a:r>
             <a:r>
-              <a:rPr lang="en-US" altLang="zh-CN"/>
+              <a:rPr lang="en-US" altLang="zh-CN" dirty="0"/>
               <a:t>to</a:t>
             </a:r>
             <a:r>
-              <a:rPr lang="zh-CN" altLang="en-US"/>
+              <a:rPr lang="zh-CN" altLang="en-US" dirty="0"/>
               <a:t> </a:t>
             </a:r>
             <a:r>
-              <a:rPr lang="en-US" altLang="zh-CN"/>
+              <a:rPr lang="en-US" altLang="zh-CN" dirty="0"/>
               <a:t>the</a:t>
             </a:r>
             <a:r>
-              <a:rPr lang="zh-CN" altLang="en-US"/>
+              <a:rPr lang="zh-CN" altLang="en-US" dirty="0"/>
               <a:t> </a:t>
             </a:r>
             <a:r>
-              <a:rPr lang="en-US" altLang="zh-CN"/>
+              <a:rPr lang="en-US" altLang="zh-CN" dirty="0"/>
               <a:t>meeting</a:t>
             </a:r>
             <a:r>
-              <a:rPr lang="zh-CN" altLang="en-US"/>
+              <a:rPr lang="zh-CN" altLang="en-US" dirty="0"/>
               <a:t> </a:t>
             </a:r>
             <a:r>
-              <a:rPr lang="en-US" altLang="zh-CN"/>
+              <a:rPr lang="en-US" altLang="zh-CN" dirty="0"/>
               <a:t>schedule</a:t>
             </a:r>
             <a:r>
-              <a:rPr lang="zh-CN" altLang="en-US"/>
+              <a:rPr lang="zh-CN" altLang="en-US" dirty="0"/>
               <a:t> </a:t>
             </a:r>
             <a:r>
-              <a:rPr lang="en-US" altLang="zh-CN"/>
+              <a:rPr lang="en-US" altLang="zh-CN" dirty="0"/>
               <a:t>doc</a:t>
             </a:r>
             <a:r>
-              <a:rPr lang="zh-CN" altLang="en-US"/>
+              <a:rPr lang="zh-CN" altLang="en-US" dirty="0"/>
               <a:t> </a:t>
             </a:r>
             <a:r>
-              <a:rPr lang="en-US" altLang="zh-CN"/>
+              <a:rPr lang="en-US" altLang="zh-CN" dirty="0"/>
               <a:t>later:</a:t>
             </a:r>
             <a:r>
-              <a:rPr lang="zh-CN" altLang="en-US"/>
+              <a:rPr lang="zh-CN" altLang="en-US" dirty="0"/>
               <a:t> </a:t>
             </a:r>
             <a:r>
-              <a:rPr lang="en-US" altLang="zh-CN">
+              <a:rPr lang="en-US" altLang="zh-CN" dirty="0">
                 <a:hlinkClick r:id="rId2"/>
               </a:rPr>
               <a:t>https://github.com/goharbor/community/blob/master/MEETING_SCHEDULE.md</a:t>
             </a:r>
-            <a:endParaRPr lang="en-US" altLang="zh-CN"/>
-          </a:p>
-          <a:p>
-            <a:r>
-              <a:rPr lang="en-US" altLang="zh-CN"/>
+            <a:endParaRPr lang="en-US" altLang="zh-CN" dirty="0"/>
+          </a:p>
+          <a:p>
+            <a:r>
+              <a:rPr lang="en-US" altLang="zh-CN" dirty="0"/>
               <a:t>The</a:t>
             </a:r>
             <a:r>
-              <a:rPr lang="zh-CN" altLang="en-US"/>
+              <a:rPr lang="zh-CN" altLang="en-US" dirty="0"/>
               <a:t> </a:t>
             </a:r>
             <a:r>
-              <a:rPr lang="en-US" altLang="zh-CN"/>
+              <a:rPr lang="en-US" altLang="zh-CN" dirty="0"/>
               <a:t>meeting</a:t>
             </a:r>
             <a:r>
-              <a:rPr lang="zh-CN" altLang="en-US"/>
+              <a:rPr lang="zh-CN" altLang="en-US" dirty="0"/>
               <a:t> </a:t>
             </a:r>
             <a:r>
-              <a:rPr lang="en-US" altLang="zh-CN"/>
+              <a:rPr lang="en-US" altLang="zh-CN" dirty="0"/>
               <a:t>slides</a:t>
             </a:r>
             <a:r>
-              <a:rPr lang="zh-CN" altLang="en-US"/>
+              <a:rPr lang="zh-CN" altLang="en-US" dirty="0"/>
               <a:t> </a:t>
             </a:r>
             <a:r>
-              <a:rPr lang="en-US" altLang="zh-CN"/>
+              <a:rPr lang="en-US" altLang="zh-CN" dirty="0"/>
               <a:t>will</a:t>
             </a:r>
             <a:r>
-              <a:rPr lang="zh-CN" altLang="en-US"/>
+              <a:rPr lang="zh-CN" altLang="en-US" dirty="0"/>
               <a:t> </a:t>
             </a:r>
             <a:r>
-              <a:rPr lang="en-US" altLang="zh-CN"/>
+              <a:rPr lang="en-US" altLang="zh-CN" dirty="0"/>
               <a:t>be</a:t>
             </a:r>
             <a:r>
-              <a:rPr lang="zh-CN" altLang="en-US"/>
+              <a:rPr lang="zh-CN" altLang="en-US" dirty="0"/>
               <a:t> </a:t>
             </a:r>
             <a:r>
-              <a:rPr lang="en-US" altLang="zh-CN"/>
+              <a:rPr lang="en-US" altLang="zh-CN" dirty="0"/>
               <a:t>uploaded</a:t>
             </a:r>
             <a:r>
-              <a:rPr lang="zh-CN" altLang="en-US"/>
+              <a:rPr lang="zh-CN" altLang="en-US" dirty="0"/>
               <a:t> </a:t>
             </a:r>
             <a:r>
-              <a:rPr lang="en-US" altLang="zh-CN"/>
+              <a:rPr lang="en-US" altLang="zh-CN" dirty="0"/>
               <a:t>to</a:t>
             </a:r>
             <a:r>
-              <a:rPr lang="zh-CN" altLang="en-US"/>
+              <a:rPr lang="zh-CN" altLang="en-US" dirty="0"/>
               <a:t> </a:t>
             </a:r>
             <a:r>
-              <a:rPr lang="en-US" altLang="zh-CN"/>
+              <a:rPr lang="en-US" altLang="zh-CN" dirty="0"/>
               <a:t>the</a:t>
             </a:r>
             <a:r>
-              <a:rPr lang="zh-CN" altLang="en-US"/>
+              <a:rPr lang="zh-CN" altLang="en-US" dirty="0"/>
               <a:t> </a:t>
             </a:r>
             <a:r>
-              <a:rPr lang="en-US" altLang="zh-CN"/>
+              <a:rPr lang="en-US" altLang="zh-CN" dirty="0"/>
               <a:t>community</a:t>
             </a:r>
             <a:r>
-              <a:rPr lang="zh-CN" altLang="en-US"/>
+              <a:rPr lang="zh-CN" altLang="en-US" dirty="0"/>
               <a:t> </a:t>
             </a:r>
             <a:r>
-              <a:rPr lang="en-US" altLang="zh-CN"/>
+              <a:rPr lang="en-US" altLang="zh-CN" dirty="0"/>
               <a:t>repo</a:t>
             </a:r>
             <a:r>
-              <a:rPr lang="zh-CN" altLang="en-US"/>
+              <a:rPr lang="zh-CN" altLang="en-US" dirty="0"/>
               <a:t> </a:t>
             </a:r>
             <a:r>
-              <a:rPr lang="en-US" altLang="zh-CN">
+              <a:rPr lang="en-US" altLang="zh-CN" dirty="0">
                 <a:hlinkClick r:id="rId3"/>
               </a:rPr>
               <a:t>https://github.com/goharbor/community</a:t>
             </a:r>
             <a:r>
-              <a:rPr lang="zh-CN" altLang="en-US"/>
+              <a:rPr lang="zh-CN" altLang="en-US" dirty="0"/>
               <a:t> </a:t>
             </a:r>
             <a:r>
-              <a:rPr lang="en-US" altLang="zh-CN"/>
+              <a:rPr lang="en-US" altLang="zh-CN" dirty="0"/>
               <a:t>and</a:t>
             </a:r>
             <a:r>
-              <a:rPr lang="zh-CN" altLang="en-US"/>
+              <a:rPr lang="zh-CN" altLang="en-US" dirty="0"/>
               <a:t> </a:t>
             </a:r>
             <a:r>
-              <a:rPr lang="en-US" altLang="zh-CN"/>
+              <a:rPr lang="en-US" altLang="zh-CN" dirty="0"/>
               <a:t>put</a:t>
             </a:r>
             <a:r>
-              <a:rPr lang="zh-CN" altLang="en-US"/>
+              <a:rPr lang="zh-CN" altLang="en-US" dirty="0"/>
               <a:t> </a:t>
             </a:r>
             <a:r>
-              <a:rPr lang="en-US" altLang="zh-CN"/>
+              <a:rPr lang="en-US" altLang="zh-CN" dirty="0"/>
               <a:t>under</a:t>
             </a:r>
             <a:r>
-              <a:rPr lang="zh-CN" altLang="en-US"/>
+              <a:rPr lang="zh-CN" altLang="en-US" dirty="0"/>
               <a:t> </a:t>
             </a:r>
             <a:r>
-              <a:rPr lang="en-US" altLang="zh-CN"/>
+              <a:rPr lang="en-US" altLang="zh-CN" dirty="0"/>
               <a:t>the</a:t>
             </a:r>
             <a:r>
-              <a:rPr lang="zh-CN" altLang="en-US"/>
+              <a:rPr lang="zh-CN" altLang="en-US" dirty="0"/>
               <a:t> </a:t>
             </a:r>
             <a:r>
-              <a:rPr lang="en-US" altLang="zh-CN"/>
+              <a:rPr lang="en-US" altLang="zh-CN" dirty="0"/>
               <a:t>‘</a:t>
             </a:r>
             <a:r>
-              <a:rPr lang="en-US" u="sng">
+              <a:rPr lang="en-US" u="sng" dirty="0">
                 <a:hlinkClick r:id="rId4"/>
               </a:rPr>
               <a:t>conf-calls</a:t>
             </a:r>
             <a:r>
-              <a:rPr lang="en-US" altLang="zh-CN"/>
+              <a:rPr lang="en-US" altLang="zh-CN" dirty="0"/>
               <a:t>’</a:t>
             </a:r>
             <a:r>
-              <a:rPr lang="zh-CN" altLang="en-US"/>
+              <a:rPr lang="zh-CN" altLang="en-US" dirty="0"/>
               <a:t> </a:t>
             </a:r>
             <a:r>
-              <a:rPr lang="en-US" altLang="zh-CN"/>
+              <a:rPr lang="en-US" altLang="zh-CN" dirty="0"/>
               <a:t>folder.</a:t>
             </a:r>
-            <a:endParaRPr lang="en-US"/>
+            <a:endParaRPr lang="en-US" dirty="0"/>
           </a:p>
         </p:txBody>
       </p:sp>

</xml_diff>

<commit_message>
updating the latest version for community meeting
</commit_message>
<xml_diff>
--- a/conf-calls/2019-09-25/community_call_2019-09-25 .pptx
+++ b/conf-calls/2019-09-25/community_call_2019-09-25 .pptx
@@ -201,7 +201,7 @@
           <a:p>
             <a:fld id="{4E90C406-5597-1243-A239-87CBB2C3F8E0}" type="datetimeFigureOut">
               <a:rPr lang="en-US" smtClean="0"/>
-              <a:t>9/22/19</a:t>
+              <a:t>9/25/19</a:t>
             </a:fld>
             <a:endParaRPr lang="en-US"/>
           </a:p>
@@ -699,7 +699,7 @@
           <a:p>
             <a:fld id="{7B2038F6-8AC7-C745-A412-1D5CBAF3D8B9}" type="datetimeFigureOut">
               <a:rPr lang="en-US" smtClean="0"/>
-              <a:t>9/22/19</a:t>
+              <a:t>9/25/19</a:t>
             </a:fld>
             <a:endParaRPr lang="en-US"/>
           </a:p>
@@ -897,7 +897,7 @@
           <a:p>
             <a:fld id="{7B2038F6-8AC7-C745-A412-1D5CBAF3D8B9}" type="datetimeFigureOut">
               <a:rPr lang="en-US" smtClean="0"/>
-              <a:t>9/22/19</a:t>
+              <a:t>9/25/19</a:t>
             </a:fld>
             <a:endParaRPr lang="en-US"/>
           </a:p>
@@ -1105,7 +1105,7 @@
           <a:p>
             <a:fld id="{7B2038F6-8AC7-C745-A412-1D5CBAF3D8B9}" type="datetimeFigureOut">
               <a:rPr lang="en-US" smtClean="0"/>
-              <a:t>9/22/19</a:t>
+              <a:t>9/25/19</a:t>
             </a:fld>
             <a:endParaRPr lang="en-US"/>
           </a:p>
@@ -4762,7 +4762,7 @@
           <a:p>
             <a:fld id="{7B2038F6-8AC7-C745-A412-1D5CBAF3D8B9}" type="datetimeFigureOut">
               <a:rPr lang="en-US" smtClean="0"/>
-              <a:t>9/22/19</a:t>
+              <a:t>9/25/19</a:t>
             </a:fld>
             <a:endParaRPr lang="en-US"/>
           </a:p>
@@ -5037,7 +5037,7 @@
           <a:p>
             <a:fld id="{7B2038F6-8AC7-C745-A412-1D5CBAF3D8B9}" type="datetimeFigureOut">
               <a:rPr lang="en-US" smtClean="0"/>
-              <a:t>9/22/19</a:t>
+              <a:t>9/25/19</a:t>
             </a:fld>
             <a:endParaRPr lang="en-US"/>
           </a:p>
@@ -5302,7 +5302,7 @@
           <a:p>
             <a:fld id="{7B2038F6-8AC7-C745-A412-1D5CBAF3D8B9}" type="datetimeFigureOut">
               <a:rPr lang="en-US" smtClean="0"/>
-              <a:t>9/22/19</a:t>
+              <a:t>9/25/19</a:t>
             </a:fld>
             <a:endParaRPr lang="en-US"/>
           </a:p>
@@ -5714,7 +5714,7 @@
           <a:p>
             <a:fld id="{7B2038F6-8AC7-C745-A412-1D5CBAF3D8B9}" type="datetimeFigureOut">
               <a:rPr lang="en-US" smtClean="0"/>
-              <a:t>9/22/19</a:t>
+              <a:t>9/25/19</a:t>
             </a:fld>
             <a:endParaRPr lang="en-US"/>
           </a:p>
@@ -5855,7 +5855,7 @@
           <a:p>
             <a:fld id="{7B2038F6-8AC7-C745-A412-1D5CBAF3D8B9}" type="datetimeFigureOut">
               <a:rPr lang="en-US" smtClean="0"/>
-              <a:t>9/22/19</a:t>
+              <a:t>9/25/19</a:t>
             </a:fld>
             <a:endParaRPr lang="en-US"/>
           </a:p>
@@ -5968,7 +5968,7 @@
           <a:p>
             <a:fld id="{7B2038F6-8AC7-C745-A412-1D5CBAF3D8B9}" type="datetimeFigureOut">
               <a:rPr lang="en-US" smtClean="0"/>
-              <a:t>9/22/19</a:t>
+              <a:t>9/25/19</a:t>
             </a:fld>
             <a:endParaRPr lang="en-US"/>
           </a:p>
@@ -6279,7 +6279,7 @@
           <a:p>
             <a:fld id="{7B2038F6-8AC7-C745-A412-1D5CBAF3D8B9}" type="datetimeFigureOut">
               <a:rPr lang="en-US" smtClean="0"/>
-              <a:t>9/22/19</a:t>
+              <a:t>9/25/19</a:t>
             </a:fld>
             <a:endParaRPr lang="en-US"/>
           </a:p>
@@ -6567,7 +6567,7 @@
           <a:p>
             <a:fld id="{7B2038F6-8AC7-C745-A412-1D5CBAF3D8B9}" type="datetimeFigureOut">
               <a:rPr lang="en-US" smtClean="0"/>
-              <a:t>9/22/19</a:t>
+              <a:t>9/25/19</a:t>
             </a:fld>
             <a:endParaRPr lang="en-US"/>
           </a:p>
@@ -6808,7 +6808,7 @@
           <a:p>
             <a:fld id="{7B2038F6-8AC7-C745-A412-1D5CBAF3D8B9}" type="datetimeFigureOut">
               <a:rPr lang="en-US" smtClean="0"/>
-              <a:t>9/22/19</a:t>
+              <a:t>9/25/19</a:t>
             </a:fld>
             <a:endParaRPr lang="en-US"/>
           </a:p>
@@ -9734,7 +9734,7 @@
               <a:defRPr/>
             </a:pPr>
             <a:r>
-              <a:rPr lang="en-US" sz="1600" b="1" kern="1200">
+              <a:rPr lang="en-US" sz="1600" b="1" kern="1200" dirty="0">
                 <a:solidFill>
                   <a:srgbClr val="0070C0"/>
                 </a:solidFill>
@@ -9745,7 +9745,7 @@
               <a:t>https://</a:t>
             </a:r>
             <a:r>
-              <a:rPr lang="en-US" sz="1600" b="1" kern="1200" err="1">
+              <a:rPr lang="en-US" sz="1600" b="1" kern="1200" dirty="0" err="1">
                 <a:solidFill>
                   <a:srgbClr val="0070C0"/>
                 </a:solidFill>
@@ -9756,7 +9756,7 @@
               <a:t>zoom.us</a:t>
             </a:r>
             <a:r>
-              <a:rPr lang="en-US" sz="1600" b="1" kern="1200">
+              <a:rPr lang="en-US" sz="1600" b="1" kern="1200" dirty="0">
                 <a:solidFill>
                   <a:srgbClr val="0070C0"/>
                 </a:solidFill>
@@ -9766,7 +9766,7 @@
               </a:rPr>
               <a:t>/j/734959521</a:t>
             </a:r>
-            <a:endParaRPr kumimoji="0" lang="en-US" sz="1600" b="1" i="0" u="none" strike="noStrike" kern="1200" cap="none" spc="0" normalizeH="0" baseline="0" noProof="0">
+            <a:endParaRPr kumimoji="0" lang="en-US" sz="1600" b="1" i="0" u="none" strike="noStrike" kern="1200" cap="none" spc="0" normalizeH="0" baseline="0" noProof="0" dirty="0">
               <a:ln>
                 <a:noFill/>
               </a:ln>
@@ -10405,12 +10405,26 @@
           <a:p>
             <a:pPr lvl="1"/>
             <a:r>
-              <a:rPr lang="en-US" sz="2800" dirty="0">
+              <a:rPr lang="en-US" sz="2000" dirty="0">
                 <a:hlinkClick r:id="rId2"/>
               </a:rPr>
               <a:t>https://goharbor.io/blogs/harbor-1.9/</a:t>
             </a:r>
-            <a:endParaRPr lang="en-US" altLang="zh-CN" sz="2800" dirty="0"/>
+            <a:endParaRPr lang="en-US" sz="2000" dirty="0"/>
+          </a:p>
+          <a:p>
+            <a:pPr lvl="1"/>
+            <a:r>
+              <a:rPr lang="en-US" sz="2000" dirty="0">
+                <a:hlinkClick r:id="rId3"/>
+              </a:rPr>
+              <a:t>https://github.com/goharbor/harbor/security/advisories/GHSA-fqvr-xx6w-m6m7 CVE-2019-16097</a:t>
+            </a:r>
+            <a:r>
+              <a:rPr lang="en-US" sz="2000" dirty="0"/>
+              <a:t> advisory. </a:t>
+            </a:r>
+            <a:endParaRPr lang="en-US" altLang="zh-CN" sz="2000" dirty="0"/>
           </a:p>
           <a:p>
             <a:r>
@@ -10469,16 +10483,16 @@
           <a:p>
             <a:pPr lvl="1"/>
             <a:r>
-              <a:rPr lang="en-US" altLang="zh-CN" sz="2800" dirty="0">
-                <a:hlinkClick r:id="rId3"/>
+              <a:rPr lang="en-US" altLang="zh-CN" sz="2000" dirty="0">
+                <a:hlinkClick r:id="rId4"/>
               </a:rPr>
               <a:t>https://github.com/goharbor/harbor/security/policy</a:t>
             </a:r>
             <a:r>
-              <a:rPr lang="zh-CN" altLang="en-US" sz="2800" dirty="0"/>
+              <a:rPr lang="zh-CN" altLang="en-US" sz="2000" dirty="0"/>
               <a:t> </a:t>
             </a:r>
-            <a:endParaRPr lang="en-US" altLang="zh-CN" sz="2800" dirty="0"/>
+            <a:endParaRPr lang="en-US" altLang="zh-CN" sz="2000" dirty="0"/>
           </a:p>
           <a:p>
             <a:r>
@@ -10509,78 +10523,78 @@
               </a:lnSpc>
             </a:pPr>
             <a:r>
-              <a:rPr lang="en-US" altLang="zh-CN" sz="2800" dirty="0"/>
+              <a:rPr lang="en-US" altLang="zh-CN" sz="2000" dirty="0"/>
               <a:t>Pluggable</a:t>
             </a:r>
             <a:r>
-              <a:rPr lang="zh-CN" altLang="en-US" sz="2800" dirty="0"/>
+              <a:rPr lang="zh-CN" altLang="en-US" sz="2000" dirty="0"/>
               <a:t> </a:t>
             </a:r>
             <a:r>
-              <a:rPr lang="en-US" altLang="zh-CN" sz="2800" dirty="0"/>
+              <a:rPr lang="en-US" altLang="zh-CN" sz="2000" dirty="0"/>
               <a:t>scanner</a:t>
             </a:r>
             <a:r>
-              <a:rPr lang="zh-CN" altLang="en-US" sz="2800" dirty="0"/>
+              <a:rPr lang="zh-CN" altLang="en-US" sz="2000" dirty="0"/>
               <a:t> </a:t>
             </a:r>
             <a:r>
-              <a:rPr lang="en-US" altLang="zh-CN" sz="2800" dirty="0"/>
+              <a:rPr lang="en-US" altLang="zh-CN" sz="2000" dirty="0"/>
               <a:t>demo</a:t>
             </a:r>
             <a:r>
-              <a:rPr lang="zh-CN" altLang="en-US" sz="2800" dirty="0"/>
+              <a:rPr lang="zh-CN" altLang="en-US" sz="2000" dirty="0"/>
               <a:t> </a:t>
             </a:r>
             <a:r>
-              <a:rPr lang="en-US" altLang="zh-CN" sz="2800" dirty="0"/>
+              <a:rPr lang="en-US" altLang="zh-CN" sz="2000" dirty="0"/>
               <a:t>by</a:t>
             </a:r>
             <a:r>
-              <a:rPr lang="zh-CN" altLang="en-US" sz="2800" dirty="0"/>
+              <a:rPr lang="zh-CN" altLang="en-US" sz="2000" dirty="0"/>
               <a:t> </a:t>
             </a:r>
             <a:r>
-              <a:rPr lang="en-US" altLang="zh-CN" sz="2800" dirty="0"/>
+              <a:rPr lang="en-US" altLang="zh-CN" sz="2000" dirty="0"/>
               <a:t>Daniel</a:t>
             </a:r>
             <a:r>
-              <a:rPr lang="zh-CN" altLang="en-US" sz="2800" dirty="0"/>
+              <a:rPr lang="zh-CN" altLang="en-US" sz="2000" dirty="0"/>
               <a:t> </a:t>
             </a:r>
             <a:r>
-              <a:rPr lang="en-US" altLang="zh-CN" sz="2800" dirty="0"/>
+              <a:rPr lang="en-US" altLang="zh-CN" sz="2000" dirty="0"/>
               <a:t>P</a:t>
             </a:r>
             <a:r>
-              <a:rPr lang="zh-CN" altLang="en-US" sz="2800" dirty="0"/>
+              <a:rPr lang="zh-CN" altLang="en-US" sz="2000" dirty="0"/>
               <a:t> </a:t>
             </a:r>
             <a:r>
-              <a:rPr lang="en-US" altLang="zh-CN" sz="2800" dirty="0"/>
+              <a:rPr lang="en-US" altLang="zh-CN" sz="2000" dirty="0"/>
               <a:t>and</a:t>
             </a:r>
             <a:r>
-              <a:rPr lang="zh-CN" altLang="en-US" sz="2800" dirty="0"/>
+              <a:rPr lang="zh-CN" altLang="en-US" sz="2000" dirty="0"/>
               <a:t> </a:t>
             </a:r>
             <a:r>
-              <a:rPr lang="en-US" altLang="zh-CN" sz="2800" dirty="0"/>
+              <a:rPr lang="en-US" altLang="zh-CN" sz="2000" dirty="0"/>
               <a:t>Steven</a:t>
             </a:r>
             <a:r>
-              <a:rPr lang="zh-CN" altLang="en-US" sz="2800" dirty="0"/>
+              <a:rPr lang="zh-CN" altLang="en-US" sz="2000" dirty="0"/>
               <a:t> </a:t>
             </a:r>
             <a:r>
-              <a:rPr lang="en-US" altLang="zh-CN" sz="2800" dirty="0"/>
+              <a:rPr lang="en-US" altLang="zh-CN" sz="2000" dirty="0"/>
               <a:t>Zou</a:t>
             </a:r>
             <a:r>
-              <a:rPr lang="zh-CN" altLang="en-US" sz="2800" dirty="0"/>
+              <a:rPr lang="zh-CN" altLang="en-US" sz="2000" dirty="0"/>
               <a:t> </a:t>
             </a:r>
-            <a:endParaRPr lang="en-US" altLang="zh-CN" sz="2800" dirty="0"/>
+            <a:endParaRPr lang="en-US" altLang="zh-CN" sz="2000" dirty="0"/>
           </a:p>
           <a:p>
             <a:pPr>
@@ -10649,16 +10663,16 @@
               <a:t> </a:t>
             </a:r>
             <a:r>
-              <a:rPr lang="en-US" altLang="zh-CN" sz="2800" dirty="0">
-                <a:hlinkClick r:id="rId4"/>
+              <a:rPr lang="en-US" altLang="zh-CN" sz="2000" dirty="0">
+                <a:hlinkClick r:id="rId5"/>
               </a:rPr>
               <a:t>https://helmsummit2019.sched.com/event/7f95f979d9e98da303c34a3aba004855</a:t>
             </a:r>
             <a:r>
-              <a:rPr lang="zh-CN" altLang="en-US" sz="2800" dirty="0"/>
+              <a:rPr lang="zh-CN" altLang="en-US" sz="2000" dirty="0"/>
               <a:t> </a:t>
             </a:r>
-            <a:endParaRPr lang="en-US" altLang="zh-CN" sz="2800" dirty="0"/>
+            <a:endParaRPr lang="en-US" altLang="zh-CN" sz="2000" dirty="0"/>
           </a:p>
         </p:txBody>
       </p:sp>

</xml_diff>